<commit_message>
1. Thesis development 2. development of the Progressive recognizer
git-svn-id: https://arabic-icr.googlecode.com/svn/trunk@27 23b4f04e-482a-c3a5-d353-cb0f12a588d0
</commit_message>
<xml_diff>
--- a/Thesis/Just In Time Arabic Handwriting Recognition.pptx
+++ b/Thesis/Just In Time Arabic Handwriting Recognition.pptx
@@ -23,7 +23,8 @@
     <p:sldId id="263" r:id="rId17"/>
     <p:sldId id="262" r:id="rId18"/>
     <p:sldId id="261" r:id="rId19"/>
-    <p:sldId id="259" r:id="rId20"/>
+    <p:sldId id="275" r:id="rId20"/>
+    <p:sldId id="259" r:id="rId21"/>
   </p:sldIdLst>
   <p:sldSz cx="9144000" cy="6858000" type="screen4x3"/>
   <p:notesSz cx="6858000" cy="9144000"/>
@@ -306,7 +307,7 @@
           <a:p>
             <a:fld id="{7350849D-FC76-4A94-A18B-DD56B5248FC8}" type="datetimeFigureOut">
               <a:rPr lang="en-GB" smtClean="0"/>
-              <a:t>11/09/2012</a:t>
+              <a:t>02/10/2012</a:t>
             </a:fld>
             <a:endParaRPr lang="en-GB"/>
           </a:p>
@@ -476,7 +477,7 @@
           <a:p>
             <a:fld id="{7350849D-FC76-4A94-A18B-DD56B5248FC8}" type="datetimeFigureOut">
               <a:rPr lang="en-GB" smtClean="0"/>
-              <a:t>11/09/2012</a:t>
+              <a:t>02/10/2012</a:t>
             </a:fld>
             <a:endParaRPr lang="en-GB"/>
           </a:p>
@@ -656,7 +657,7 @@
           <a:p>
             <a:fld id="{7350849D-FC76-4A94-A18B-DD56B5248FC8}" type="datetimeFigureOut">
               <a:rPr lang="en-GB" smtClean="0"/>
-              <a:t>11/09/2012</a:t>
+              <a:t>02/10/2012</a:t>
             </a:fld>
             <a:endParaRPr lang="en-GB"/>
           </a:p>
@@ -826,7 +827,7 @@
           <a:p>
             <a:fld id="{7350849D-FC76-4A94-A18B-DD56B5248FC8}" type="datetimeFigureOut">
               <a:rPr lang="en-GB" smtClean="0"/>
-              <a:t>11/09/2012</a:t>
+              <a:t>02/10/2012</a:t>
             </a:fld>
             <a:endParaRPr lang="en-GB"/>
           </a:p>
@@ -1072,7 +1073,7 @@
           <a:p>
             <a:fld id="{7350849D-FC76-4A94-A18B-DD56B5248FC8}" type="datetimeFigureOut">
               <a:rPr lang="en-GB" smtClean="0"/>
-              <a:t>11/09/2012</a:t>
+              <a:t>02/10/2012</a:t>
             </a:fld>
             <a:endParaRPr lang="en-GB"/>
           </a:p>
@@ -1360,7 +1361,7 @@
           <a:p>
             <a:fld id="{7350849D-FC76-4A94-A18B-DD56B5248FC8}" type="datetimeFigureOut">
               <a:rPr lang="en-GB" smtClean="0"/>
-              <a:t>11/09/2012</a:t>
+              <a:t>02/10/2012</a:t>
             </a:fld>
             <a:endParaRPr lang="en-GB"/>
           </a:p>
@@ -1782,7 +1783,7 @@
           <a:p>
             <a:fld id="{7350849D-FC76-4A94-A18B-DD56B5248FC8}" type="datetimeFigureOut">
               <a:rPr lang="en-GB" smtClean="0"/>
-              <a:t>11/09/2012</a:t>
+              <a:t>02/10/2012</a:t>
             </a:fld>
             <a:endParaRPr lang="en-GB"/>
           </a:p>
@@ -1900,7 +1901,7 @@
           <a:p>
             <a:fld id="{7350849D-FC76-4A94-A18B-DD56B5248FC8}" type="datetimeFigureOut">
               <a:rPr lang="en-GB" smtClean="0"/>
-              <a:t>11/09/2012</a:t>
+              <a:t>02/10/2012</a:t>
             </a:fld>
             <a:endParaRPr lang="en-GB"/>
           </a:p>
@@ -1995,7 +1996,7 @@
           <a:p>
             <a:fld id="{7350849D-FC76-4A94-A18B-DD56B5248FC8}" type="datetimeFigureOut">
               <a:rPr lang="en-GB" smtClean="0"/>
-              <a:t>11/09/2012</a:t>
+              <a:t>02/10/2012</a:t>
             </a:fld>
             <a:endParaRPr lang="en-GB"/>
           </a:p>
@@ -2272,7 +2273,7 @@
           <a:p>
             <a:fld id="{7350849D-FC76-4A94-A18B-DD56B5248FC8}" type="datetimeFigureOut">
               <a:rPr lang="en-GB" smtClean="0"/>
-              <a:t>11/09/2012</a:t>
+              <a:t>02/10/2012</a:t>
             </a:fld>
             <a:endParaRPr lang="en-GB"/>
           </a:p>
@@ -2525,7 +2526,7 @@
           <a:p>
             <a:fld id="{7350849D-FC76-4A94-A18B-DD56B5248FC8}" type="datetimeFigureOut">
               <a:rPr lang="en-GB" smtClean="0"/>
-              <a:t>11/09/2012</a:t>
+              <a:t>02/10/2012</a:t>
             </a:fld>
             <a:endParaRPr lang="en-GB"/>
           </a:p>
@@ -2738,7 +2739,7 @@
           <a:p>
             <a:fld id="{7350849D-FC76-4A94-A18B-DD56B5248FC8}" type="datetimeFigureOut">
               <a:rPr lang="en-GB" smtClean="0"/>
-              <a:t>11/09/2012</a:t>
+              <a:t>02/10/2012</a:t>
             </a:fld>
             <a:endParaRPr lang="en-GB"/>
           </a:p>
@@ -3357,7 +3358,7 @@
           <a:graphicData uri="http://schemas.openxmlformats.org/presentationml/2006/ole">
             <mc:AlternateContent xmlns:mc="http://schemas.openxmlformats.org/markup-compatibility/2006">
               <mc:Choice xmlns:v="urn:schemas-microsoft-com:vml" Requires="v">
-                <p:oleObj spid="_x0000_s2066" name="Equation" r:id="rId3" imgW="1765080" imgH="482400" progId="Equation.DSMT4">
+                <p:oleObj spid="_x0000_s2074" name="Equation" r:id="rId3" imgW="1765080" imgH="482400" progId="Equation.DSMT4">
                   <p:embed/>
                 </p:oleObj>
               </mc:Choice>
@@ -3450,7 +3451,7 @@
           <a:graphicData uri="http://schemas.openxmlformats.org/presentationml/2006/ole">
             <mc:AlternateContent xmlns:mc="http://schemas.openxmlformats.org/markup-compatibility/2006">
               <mc:Choice xmlns:v="urn:schemas-microsoft-com:vml" Requires="v">
-                <p:oleObj spid="_x0000_s2067" name="Equation" r:id="rId5" imgW="1028520" imgH="253800" progId="Equation.DSMT4">
+                <p:oleObj spid="_x0000_s2075" name="Equation" r:id="rId5" imgW="1028520" imgH="253800" progId="Equation.DSMT4">
                   <p:embed/>
                 </p:oleObj>
               </mc:Choice>
@@ -3543,7 +3544,7 @@
           <a:graphicData uri="http://schemas.openxmlformats.org/presentationml/2006/ole">
             <mc:AlternateContent xmlns:mc="http://schemas.openxmlformats.org/markup-compatibility/2006">
               <mc:Choice xmlns:v="urn:schemas-microsoft-com:vml" Requires="v">
-                <p:oleObj spid="_x0000_s2068" name="Equation" r:id="rId7" imgW="1396800" imgH="253800" progId="Equation.DSMT4">
+                <p:oleObj spid="_x0000_s2076" name="Equation" r:id="rId7" imgW="1396800" imgH="253800" progId="Equation.DSMT4">
                   <p:embed/>
                 </p:oleObj>
               </mc:Choice>
@@ -3636,7 +3637,7 @@
           <a:graphicData uri="http://schemas.openxmlformats.org/presentationml/2006/ole">
             <mc:AlternateContent xmlns:mc="http://schemas.openxmlformats.org/markup-compatibility/2006">
               <mc:Choice xmlns:v="urn:schemas-microsoft-com:vml" Requires="v">
-                <p:oleObj spid="_x0000_s2069" name="Equation" r:id="rId9" imgW="1828800" imgH="253800" progId="Equation.DSMT4">
+                <p:oleObj spid="_x0000_s2077" name="Equation" r:id="rId9" imgW="1828800" imgH="253800" progId="Equation.DSMT4">
                   <p:embed/>
                 </p:oleObj>
               </mc:Choice>
@@ -4914,6 +4915,13 @@
   <p:clrMapOvr>
     <a:masterClrMapping/>
   </p:clrMapOvr>
+  <p:timing>
+    <p:tnLst>
+      <p:par>
+        <p:cTn id="1" dur="indefinite" restart="never" nodeType="tmRoot"/>
+      </p:par>
+    </p:tnLst>
+  </p:timing>
 </p:sld>
 </file>
 
@@ -5169,6 +5177,13 @@
   <p:clrMapOvr>
     <a:masterClrMapping/>
   </p:clrMapOvr>
+  <p:timing>
+    <p:tnLst>
+      <p:par>
+        <p:cTn id="1" dur="indefinite" restart="never" nodeType="tmRoot"/>
+      </p:par>
+    </p:tnLst>
+  </p:timing>
 </p:sld>
 </file>
 
@@ -5265,6 +5280,13 @@
   <p:clrMapOvr>
     <a:masterClrMapping/>
   </p:clrMapOvr>
+  <p:timing>
+    <p:tnLst>
+      <p:par>
+        <p:cTn id="1" dur="indefinite" restart="never" nodeType="tmRoot"/>
+      </p:par>
+    </p:tnLst>
+  </p:timing>
 </p:sld>
 </file>
 
@@ -5358,6 +5380,13 @@
   <p:clrMapOvr>
     <a:masterClrMapping/>
   </p:clrMapOvr>
+  <p:timing>
+    <p:tnLst>
+      <p:par>
+        <p:cTn id="1" dur="indefinite" restart="never" nodeType="tmRoot"/>
+      </p:par>
+    </p:tnLst>
+  </p:timing>
 </p:sld>
 </file>
 
@@ -5547,6 +5576,13 @@
   <p:clrMapOvr>
     <a:masterClrMapping/>
   </p:clrMapOvr>
+  <p:timing>
+    <p:tnLst>
+      <p:par>
+        <p:cTn id="1" dur="indefinite" restart="never" nodeType="tmRoot"/>
+      </p:par>
+    </p:tnLst>
+  </p:timing>
 </p:sld>
 </file>
 
@@ -5579,14 +5615,12 @@
         </p:nvSpPr>
         <p:spPr/>
         <p:txBody>
-          <a:bodyPr>
-            <a:normAutofit fontScale="90000"/>
-          </a:bodyPr>
+          <a:bodyPr/>
           <a:lstStyle/>
           <a:p>
             <a:r>
               <a:rPr lang="en-US" dirty="0" smtClean="0"/>
-              <a:t>Online Progressive Letters Recognition</a:t>
+              <a:t>Learning Process Overview</a:t>
             </a:r>
             <a:endParaRPr lang="en-GB" dirty="0"/>
           </a:p>
@@ -5594,66 +5628,48 @@
       </p:sp>
       <p:sp>
         <p:nvSpPr>
-          <p:cNvPr id="3" name="Content Placeholder 2"/>
-          <p:cNvSpPr>
-            <a:spLocks noGrp="1"/>
-          </p:cNvSpPr>
-          <p:nvPr>
-            <p:ph idx="1"/>
-          </p:nvPr>
+          <p:cNvPr id="4" name="Flowchart: Process 3"/>
+          <p:cNvSpPr/>
+          <p:nvPr/>
         </p:nvSpPr>
-        <p:spPr/>
+        <p:spPr>
+          <a:xfrm>
+            <a:off x="3131840" y="1628800"/>
+            <a:ext cx="1944216" cy="1152128"/>
+          </a:xfrm>
+          <a:prstGeom prst="flowChartProcess">
+            <a:avLst/>
+          </a:prstGeom>
+        </p:spPr>
+        <p:style>
+          <a:lnRef idx="2">
+            <a:schemeClr val="accent1">
+              <a:shade val="50000"/>
+            </a:schemeClr>
+          </a:lnRef>
+          <a:fillRef idx="1">
+            <a:schemeClr val="accent1"/>
+          </a:fillRef>
+          <a:effectRef idx="0">
+            <a:schemeClr val="accent1"/>
+          </a:effectRef>
+          <a:fontRef idx="minor">
+            <a:schemeClr val="lt1"/>
+          </a:fontRef>
+        </p:style>
         <p:txBody>
-          <a:bodyPr>
-            <a:normAutofit/>
-          </a:bodyPr>
+          <a:bodyPr rtlCol="0" anchor="ctr"/>
           <a:lstStyle/>
           <a:p>
+            <a:pPr algn="ctr"/>
             <a:r>
               <a:rPr lang="en-US" dirty="0" smtClean="0"/>
-              <a:t>Recognition</a:t>
-            </a:r>
-          </a:p>
-          <a:p>
-            <a:pPr lvl="1"/>
-            <a:r>
-              <a:rPr lang="en-US" dirty="0" smtClean="0"/>
-              <a:t>Segmentation algorithm</a:t>
-            </a:r>
-          </a:p>
-          <a:p>
-            <a:pPr lvl="2"/>
-            <a:r>
-              <a:rPr lang="en-US" dirty="0" smtClean="0"/>
-              <a:t>Candidate Point</a:t>
-            </a:r>
-          </a:p>
-          <a:p>
-            <a:pPr lvl="2"/>
-            <a:r>
-              <a:rPr lang="en-US" dirty="0" smtClean="0"/>
-              <a:t>Better Point </a:t>
-            </a:r>
-            <a:r>
-              <a:rPr lang="en-US" smtClean="0"/>
-              <a:t>Segmentation Selection</a:t>
-            </a:r>
-            <a:endParaRPr lang="en-US" dirty="0" smtClean="0"/>
-          </a:p>
-          <a:p>
-            <a:pPr lvl="1"/>
-            <a:endParaRPr lang="en-US" dirty="0" smtClean="0"/>
-          </a:p>
-          <a:p>
-            <a:pPr lvl="1"/>
-            <a:endParaRPr lang="en-US" dirty="0" smtClean="0"/>
-          </a:p>
-          <a:p>
-            <a:pPr lvl="1"/>
-            <a:endParaRPr lang="en-US" dirty="0" smtClean="0"/>
-          </a:p>
-          <a:p>
-            <a:pPr lvl="1"/>
+              <a:t>Letters </a:t>
+            </a:r>
+            <a:r>
+              <a:rPr lang="en-US" dirty="0" err="1" smtClean="0"/>
+              <a:t>Colle</a:t>
+            </a:r>
             <a:endParaRPr lang="en-GB" dirty="0"/>
           </a:p>
         </p:txBody>
@@ -5661,13 +5677,20 @@
     </p:spTree>
     <p:extLst>
       <p:ext uri="{BB962C8B-B14F-4D97-AF65-F5344CB8AC3E}">
-        <p14:creationId xmlns:p14="http://schemas.microsoft.com/office/powerpoint/2010/main" val="2106614807"/>
+        <p14:creationId xmlns:p14="http://schemas.microsoft.com/office/powerpoint/2010/main" val="887313169"/>
       </p:ext>
     </p:extLst>
   </p:cSld>
   <p:clrMapOvr>
     <a:masterClrMapping/>
   </p:clrMapOvr>
+  <p:timing>
+    <p:tnLst>
+      <p:par>
+        <p:cTn id="1" dur="indefinite" restart="never" nodeType="tmRoot"/>
+      </p:par>
+    </p:tnLst>
+  </p:timing>
 </p:sld>
 </file>
 
@@ -5742,11 +5765,7 @@
             </a:r>
             <a:r>
               <a:rPr lang="en-US" dirty="0" smtClean="0"/>
-              <a:t>rabic </a:t>
-            </a:r>
-            <a:r>
-              <a:rPr lang="en-US" dirty="0" smtClean="0"/>
-              <a:t>letters is </a:t>
+              <a:t>rabic letters is </a:t>
             </a:r>
             <a:r>
               <a:rPr lang="en-US" dirty="0" err="1" smtClean="0"/>
@@ -5756,7 +5775,6 @@
               <a:rPr lang="en-US" dirty="0" smtClean="0"/>
               <a:t> ...</a:t>
             </a:r>
-            <a:endParaRPr lang="en-US" dirty="0" smtClean="0"/>
           </a:p>
           <a:p>
             <a:r>
@@ -5797,6 +5815,127 @@
     <p:extLst>
       <p:ext uri="{BB962C8B-B14F-4D97-AF65-F5344CB8AC3E}">
         <p14:creationId xmlns:p14="http://schemas.microsoft.com/office/powerpoint/2010/main" val="2134239900"/>
+      </p:ext>
+    </p:extLst>
+  </p:cSld>
+  <p:clrMapOvr>
+    <a:masterClrMapping/>
+  </p:clrMapOvr>
+</p:sld>
+</file>
+
+<file path=ppt/slides/slide20.xml><?xml version="1.0" encoding="utf-8"?>
+<p:sld xmlns:a="http://schemas.openxmlformats.org/drawingml/2006/main" xmlns:r="http://schemas.openxmlformats.org/officeDocument/2006/relationships" xmlns:p="http://schemas.openxmlformats.org/presentationml/2006/main">
+  <p:cSld>
+    <p:spTree>
+      <p:nvGrpSpPr>
+        <p:cNvPr id="1" name=""/>
+        <p:cNvGrpSpPr/>
+        <p:nvPr/>
+      </p:nvGrpSpPr>
+      <p:grpSpPr>
+        <a:xfrm>
+          <a:off x="0" y="0"/>
+          <a:ext cx="0" cy="0"/>
+          <a:chOff x="0" y="0"/>
+          <a:chExt cx="0" cy="0"/>
+        </a:xfrm>
+      </p:grpSpPr>
+      <p:sp>
+        <p:nvSpPr>
+          <p:cNvPr id="2" name="Title 1"/>
+          <p:cNvSpPr>
+            <a:spLocks noGrp="1"/>
+          </p:cNvSpPr>
+          <p:nvPr>
+            <p:ph type="title"/>
+          </p:nvPr>
+        </p:nvSpPr>
+        <p:spPr/>
+        <p:txBody>
+          <a:bodyPr>
+            <a:normAutofit fontScale="90000"/>
+          </a:bodyPr>
+          <a:lstStyle/>
+          <a:p>
+            <a:r>
+              <a:rPr lang="en-US" dirty="0" smtClean="0"/>
+              <a:t>Online Progressive Letters Recognition</a:t>
+            </a:r>
+            <a:endParaRPr lang="en-GB" dirty="0"/>
+          </a:p>
+        </p:txBody>
+      </p:sp>
+      <p:sp>
+        <p:nvSpPr>
+          <p:cNvPr id="3" name="Content Placeholder 2"/>
+          <p:cNvSpPr>
+            <a:spLocks noGrp="1"/>
+          </p:cNvSpPr>
+          <p:nvPr>
+            <p:ph idx="1"/>
+          </p:nvPr>
+        </p:nvSpPr>
+        <p:spPr/>
+        <p:txBody>
+          <a:bodyPr>
+            <a:normAutofit/>
+          </a:bodyPr>
+          <a:lstStyle/>
+          <a:p>
+            <a:r>
+              <a:rPr lang="en-US" dirty="0" smtClean="0"/>
+              <a:t>Recognition</a:t>
+            </a:r>
+          </a:p>
+          <a:p>
+            <a:pPr lvl="1"/>
+            <a:r>
+              <a:rPr lang="en-US" dirty="0" smtClean="0"/>
+              <a:t>Segmentation algorithm</a:t>
+            </a:r>
+          </a:p>
+          <a:p>
+            <a:pPr lvl="2"/>
+            <a:r>
+              <a:rPr lang="en-US" dirty="0" smtClean="0"/>
+              <a:t>Candidate Point</a:t>
+            </a:r>
+          </a:p>
+          <a:p>
+            <a:pPr lvl="2"/>
+            <a:r>
+              <a:rPr lang="en-US" dirty="0" smtClean="0"/>
+              <a:t>Better Point </a:t>
+            </a:r>
+            <a:r>
+              <a:rPr lang="en-US" smtClean="0"/>
+              <a:t>Segmentation Selection</a:t>
+            </a:r>
+            <a:endParaRPr lang="en-US" dirty="0" smtClean="0"/>
+          </a:p>
+          <a:p>
+            <a:pPr lvl="1"/>
+            <a:endParaRPr lang="en-US" dirty="0" smtClean="0"/>
+          </a:p>
+          <a:p>
+            <a:pPr lvl="1"/>
+            <a:endParaRPr lang="en-US" dirty="0" smtClean="0"/>
+          </a:p>
+          <a:p>
+            <a:pPr lvl="1"/>
+            <a:endParaRPr lang="en-US" dirty="0" smtClean="0"/>
+          </a:p>
+          <a:p>
+            <a:pPr lvl="1"/>
+            <a:endParaRPr lang="en-GB" dirty="0"/>
+          </a:p>
+        </p:txBody>
+      </p:sp>
+    </p:spTree>
+    <p:extLst>
+      <p:ext uri="{BB962C8B-B14F-4D97-AF65-F5344CB8AC3E}">
+        <p14:creationId xmlns:p14="http://schemas.microsoft.com/office/powerpoint/2010/main" val="2106614807"/>
       </p:ext>
     </p:extLst>
   </p:cSld>
@@ -7849,7 +7988,7 @@
           <a:graphicData uri="http://schemas.openxmlformats.org/presentationml/2006/ole">
             <mc:AlternateContent xmlns:mc="http://schemas.openxmlformats.org/markup-compatibility/2006">
               <mc:Choice xmlns:v="urn:schemas-microsoft-com:vml" Requires="v">
-                <p:oleObj spid="_x0000_s3078" name="Equation" r:id="rId3" imgW="2197080" imgH="317160" progId="Equation.DSMT4">
+                <p:oleObj spid="_x0000_s3082" name="Equation" r:id="rId3" imgW="2197080" imgH="317160" progId="Equation.DSMT4">
                   <p:embed/>
                 </p:oleObj>
               </mc:Choice>
@@ -7906,7 +8045,7 @@
           <a:graphicData uri="http://schemas.openxmlformats.org/presentationml/2006/ole">
             <mc:AlternateContent xmlns:mc="http://schemas.openxmlformats.org/markup-compatibility/2006">
               <mc:Choice xmlns:v="urn:schemas-microsoft-com:vml" Requires="v">
-                <p:oleObj spid="_x0000_s3079" name="Equation" r:id="rId5" imgW="736560" imgH="177480" progId="Equation.DSMT4">
+                <p:oleObj spid="_x0000_s3083" name="Equation" r:id="rId5" imgW="736560" imgH="177480" progId="Equation.DSMT4">
                   <p:embed/>
                 </p:oleObj>
               </mc:Choice>
@@ -8069,8 +8208,8 @@
           </a:p>
         </p:txBody>
       </p:sp>
-      <mc:AlternateContent xmlns:mc="http://schemas.openxmlformats.org/markup-compatibility/2006">
-        <mc:Choice xmlns:a14="http://schemas.microsoft.com/office/drawing/2010/main" Requires="a14">
+      <mc:AlternateContent xmlns:mc="http://schemas.openxmlformats.org/markup-compatibility/2006" xmlns:a14="http://schemas.microsoft.com/office/drawing/2010/main">
+        <mc:Choice Requires="a14">
           <p:sp>
             <p:nvSpPr>
               <p:cNvPr id="5" name="Content Placeholder 4"/>
@@ -8265,7 +8404,6 @@
                   <a:rPr lang="en-US" altLang="zh-CN" dirty="0" smtClean="0"/>
                   <a:t> </a:t>
                 </a:r>
-                <a:endParaRPr lang="en-US" altLang="zh-CN" dirty="0" smtClean="0"/>
               </a:p>
               <a:p>
                 <a:pPr>
@@ -8281,7 +8419,7 @@
             </p:txBody>
           </p:sp>
         </mc:Choice>
-        <mc:Fallback>
+        <mc:Fallback xmlns="">
           <p:sp>
             <p:nvSpPr>
               <p:cNvPr id="5" name="Content Placeholder 4"/>
@@ -10915,7 +11053,7 @@
           <a:graphicData uri="http://schemas.openxmlformats.org/presentationml/2006/ole">
             <mc:AlternateContent xmlns:mc="http://schemas.openxmlformats.org/markup-compatibility/2006">
               <mc:Choice xmlns:v="urn:schemas-microsoft-com:vml" Requires="v">
-                <p:oleObj spid="_x0000_s4104" name="Equation" r:id="rId4" imgW="266400" imgH="444240" progId="Equation.DSMT4">
+                <p:oleObj spid="_x0000_s4108" name="Equation" r:id="rId4" imgW="266400" imgH="444240" progId="Equation.DSMT4">
                   <p:embed/>
                 </p:oleObj>
               </mc:Choice>
@@ -10972,7 +11110,7 @@
           <a:graphicData uri="http://schemas.openxmlformats.org/presentationml/2006/ole">
             <mc:AlternateContent xmlns:mc="http://schemas.openxmlformats.org/markup-compatibility/2006">
               <mc:Choice xmlns:v="urn:schemas-microsoft-com:vml" Requires="v">
-                <p:oleObj spid="_x0000_s4105" name="Equation" r:id="rId6" imgW="1574640" imgH="253800" progId="Equation.DSMT4">
+                <p:oleObj spid="_x0000_s4109" name="Equation" r:id="rId6" imgW="1574640" imgH="253800" progId="Equation.DSMT4">
                   <p:embed/>
                 </p:oleObj>
               </mc:Choice>
@@ -14859,7 +14997,7 @@
           <a:graphicData uri="http://schemas.openxmlformats.org/presentationml/2006/ole">
             <mc:AlternateContent xmlns:mc="http://schemas.openxmlformats.org/markup-compatibility/2006">
               <mc:Choice xmlns:v="urn:schemas-microsoft-com:vml" Requires="v">
-                <p:oleObj spid="_x0000_s1034" name="Equation" r:id="rId3" imgW="2501640" imgH="342720" progId="Equation.DSMT4">
+                <p:oleObj spid="_x0000_s1038" name="Equation" r:id="rId3" imgW="2501640" imgH="342720" progId="Equation.DSMT4">
                   <p:embed/>
                 </p:oleObj>
               </mc:Choice>
@@ -15186,7 +15324,7 @@
           <a:graphicData uri="http://schemas.openxmlformats.org/presentationml/2006/ole">
             <mc:AlternateContent xmlns:mc="http://schemas.openxmlformats.org/markup-compatibility/2006">
               <mc:Choice xmlns:v="urn:schemas-microsoft-com:vml" Requires="v">
-                <p:oleObj spid="_x0000_s1035" name="Equation" r:id="rId5" imgW="1473120" imgH="253800" progId="Equation.DSMT4">
+                <p:oleObj spid="_x0000_s1039" name="Equation" r:id="rId5" imgW="1473120" imgH="253800" progId="Equation.DSMT4">
                   <p:embed/>
                 </p:oleObj>
               </mc:Choice>

</xml_diff>